<commit_message>
improved meth_Misc_Alert(), more tests
</commit_message>
<xml_diff>
--- a/tests/var/testOpenTBS.pptx
+++ b/tests/var/testOpenTBS.pptx
@@ -1430,13 +1430,7 @@
               <a:rPr b="0" lang="fr-FR" sz="4400" spc="-1" strike="noStrike">
                 <a:latin typeface="Arial"/>
               </a:rPr>
-              <a:t>Cliquez pour éditer le format du </a:t>
-            </a:r>
-            <a:r>
-              <a:rPr b="0" lang="fr-FR" sz="4400" spc="-1" strike="noStrike">
-                <a:latin typeface="Arial"/>
-              </a:rPr>
-              <a:t>texte-titre</a:t>
+              <a:t>Cliquez pour éditer le format du texte-titre</a:t>
             </a:r>
             <a:endParaRPr b="0" lang="fr-FR" sz="4400" spc="-1" strike="noStrike">
               <a:latin typeface="Arial"/>
@@ -1669,7 +1663,7 @@
         <p:spPr>
           <a:xfrm>
             <a:off x="504000" y="29160"/>
-            <a:ext cx="9064800" cy="1339920"/>
+            <a:ext cx="9064080" cy="1339920"/>
           </a:xfrm>
           <a:prstGeom prst="rect">
             <a:avLst/>
@@ -1712,39 +1706,16 @@
           </a:p>
         </p:txBody>
       </p:sp>
-      <p:pic>
-        <p:nvPicPr>
-          <p:cNvPr id="39" name="" descr="[onshow.pic2;ope=changepic;tagpos=inside;unique]"/>
-          <p:cNvPicPr/>
-          <p:nvPr/>
-        </p:nvPicPr>
-        <p:blipFill>
-          <a:blip r:embed="rId1"/>
-          <a:stretch/>
-        </p:blipFill>
-        <p:spPr>
-          <a:xfrm>
-            <a:off x="1728000" y="1099440"/>
-            <a:ext cx="4767120" cy="3573720"/>
-          </a:xfrm>
-          <a:prstGeom prst="rect">
-            <a:avLst/>
-          </a:prstGeom>
-          <a:ln>
-            <a:noFill/>
-          </a:ln>
-        </p:spPr>
-      </p:pic>
-      <p:sp>
-        <p:nvSpPr>
-          <p:cNvPr id="40" name="CustomShape 2"/>
+      <p:sp>
+        <p:nvSpPr>
+          <p:cNvPr id="39" name="CustomShape 2"/>
           <p:cNvSpPr/>
           <p:nvPr/>
         </p:nvSpPr>
         <p:spPr>
           <a:xfrm>
             <a:off x="1008000" y="4968000"/>
-            <a:ext cx="5969880" cy="358200"/>
+            <a:ext cx="5969160" cy="357480"/>
           </a:xfrm>
           <a:prstGeom prst="rect">
             <a:avLst/>
@@ -1760,57 +1731,6 @@
           <a:effectRef idx="0"/>
           <a:fontRef idx="minor"/>
         </p:style>
-      </p:sp>
-      <p:sp>
-        <p:nvSpPr>
-          <p:cNvPr id="41" name="CustomShape 3"/>
-          <p:cNvSpPr/>
-          <p:nvPr/>
-        </p:nvSpPr>
-        <p:spPr>
-          <a:xfrm>
-            <a:off x="1152000" y="5040000"/>
-            <a:ext cx="4750200" cy="363960"/>
-          </a:xfrm>
-          <a:prstGeom prst="rect">
-            <a:avLst/>
-          </a:prstGeom>
-          <a:noFill/>
-          <a:ln>
-            <a:noFill/>
-          </a:ln>
-        </p:spPr>
-        <p:style>
-          <a:lnRef idx="0"/>
-          <a:fillRef idx="0"/>
-          <a:effectRef idx="0"/>
-          <a:fontRef idx="minor"/>
-        </p:style>
-        <p:txBody>
-          <a:bodyPr lIns="90000" rIns="90000" tIns="45000" bIns="45000">
-            <a:spAutoFit/>
-          </a:bodyPr>
-          <a:p>
-            <a:pPr>
-              <a:lnSpc>
-                <a:spcPct val="100000"/>
-              </a:lnSpc>
-            </a:pPr>
-            <a:r>
-              <a:rPr b="0" lang="fr-FR" sz="1800" spc="-1" strike="noStrike">
-                <a:solidFill>
-                  <a:srgbClr val="000000"/>
-                </a:solidFill>
-                <a:latin typeface="Arial"/>
-                <a:ea typeface="DejaVu Sans"/>
-              </a:rPr>
-              <a:t>[onshow.textreplace]</a:t>
-            </a:r>
-            <a:endParaRPr b="0" lang="fr-FR" sz="1800" spc="-1" strike="noStrike">
-              <a:latin typeface="Arial"/>
-            </a:endParaRPr>
-          </a:p>
-        </p:txBody>
       </p:sp>
     </p:spTree>
   </p:cSld>
@@ -1842,67 +1762,6 @@
           <a:chExt cx="0" cy="0"/>
         </a:xfrm>
       </p:grpSpPr>
-      <p:sp>
-        <p:nvSpPr>
-          <p:cNvPr id="42" name="CustomShape 1"/>
-          <p:cNvSpPr/>
-          <p:nvPr/>
-        </p:nvSpPr>
-        <p:spPr>
-          <a:xfrm>
-            <a:off x="864000" y="576000"/>
-            <a:ext cx="3167280" cy="638280"/>
-          </a:xfrm>
-          <a:prstGeom prst="rect">
-            <a:avLst/>
-          </a:prstGeom>
-          <a:noFill/>
-          <a:ln>
-            <a:noFill/>
-          </a:ln>
-        </p:spPr>
-        <p:style>
-          <a:lnRef idx="0"/>
-          <a:fillRef idx="0"/>
-          <a:effectRef idx="0"/>
-          <a:fontRef idx="minor"/>
-        </p:style>
-        <p:txBody>
-          <a:bodyPr lIns="90000" rIns="90000" tIns="45000" bIns="45000">
-            <a:spAutoFit/>
-          </a:bodyPr>
-          <a:p>
-            <a:pPr>
-              <a:lnSpc>
-                <a:spcPct val="100000"/>
-              </a:lnSpc>
-            </a:pPr>
-            <a:r>
-              <a:rPr b="0" lang="fr-FR" sz="1800" spc="-1" strike="noStrike">
-                <a:solidFill>
-                  <a:srgbClr val="000000"/>
-                </a:solidFill>
-                <a:latin typeface="Arial"/>
-                <a:ea typeface="DejaVu Sans"/>
-              </a:rPr>
-              <a:t>[onshow.textreplace2]</a:t>
-            </a:r>
-            <a:endParaRPr b="0" lang="fr-FR" sz="1800" spc="-1" strike="noStrike">
-              <a:latin typeface="Arial"/>
-            </a:endParaRPr>
-          </a:p>
-          <a:p>
-            <a:pPr>
-              <a:lnSpc>
-                <a:spcPct val="100000"/>
-              </a:lnSpc>
-            </a:pPr>
-            <a:endParaRPr b="0" lang="fr-FR" sz="1800" spc="-1" strike="noStrike">
-              <a:latin typeface="Arial"/>
-            </a:endParaRPr>
-          </a:p>
-        </p:txBody>
-      </p:sp>
     </p:spTree>
   </p:cSld>
   <mc:AlternateContent>

</xml_diff>